<commit_message>
feat: add lession 1-3
</commit_message>
<xml_diff>
--- a/模板.pptx
+++ b/模板.pptx
@@ -5,10 +5,10 @@
     <p:sldMasterId id="2147483648" r:id="rId1"/>
   </p:sldMasterIdLst>
   <p:notesMasterIdLst>
-    <p:notesMasterId r:id="rId19"/>
+    <p:notesMasterId r:id="rId18"/>
   </p:notesMasterIdLst>
   <p:handoutMasterIdLst>
-    <p:handoutMasterId r:id="rId20"/>
+    <p:handoutMasterId r:id="rId19"/>
   </p:handoutMasterIdLst>
   <p:sldIdLst>
     <p:sldId id="307" r:id="rId2"/>
@@ -21,13 +21,12 @@
     <p:sldId id="537" r:id="rId9"/>
     <p:sldId id="536" r:id="rId10"/>
     <p:sldId id="540" r:id="rId11"/>
-    <p:sldId id="960" r:id="rId12"/>
-    <p:sldId id="541" r:id="rId13"/>
-    <p:sldId id="314" r:id="rId14"/>
-    <p:sldId id="315" r:id="rId15"/>
-    <p:sldId id="515" r:id="rId16"/>
-    <p:sldId id="367" r:id="rId17"/>
-    <p:sldId id="653" r:id="rId18"/>
+    <p:sldId id="991" r:id="rId12"/>
+    <p:sldId id="314" r:id="rId13"/>
+    <p:sldId id="315" r:id="rId14"/>
+    <p:sldId id="515" r:id="rId15"/>
+    <p:sldId id="367" r:id="rId16"/>
+    <p:sldId id="653" r:id="rId17"/>
   </p:sldIdLst>
   <p:sldSz cx="12192000" cy="6858000"/>
   <p:notesSz cx="6858000" cy="9144000"/>
@@ -222,7 +221,7 @@
                 <a:latin typeface="微软雅黑" panose="020B0503020204020204" charset="-122"/>
                 <a:ea typeface="微软雅黑" panose="020B0503020204020204" charset="-122"/>
               </a:rPr>
-              <a:t>2021/12/23</a:t>
+              <a:t>2023/10/8</a:t>
             </a:fld>
             <a:endParaRPr lang="zh-CN" altLang="en-US">
               <a:latin typeface="微软雅黑" panose="020B0503020204020204" charset="-122"/>
@@ -405,7 +404,7 @@
           <a:p>
             <a:fld id="{1AC49D05-6128-4D0D-A32A-06A5E73B386C}" type="datetimeFigureOut">
               <a:rPr lang="zh-CN" altLang="en-US" smtClean="0"/>
-              <a:t>2021/12/23</a:t>
+              <a:t>2023/10/8</a:t>
             </a:fld>
             <a:endParaRPr lang="zh-CN" altLang="en-US"/>
           </a:p>
@@ -1132,7 +1131,7 @@
           <a:p>
             <a:fld id="{9EFD9D74-47D9-4702-A33C-335B63B48DBF}" type="datetimeFigureOut">
               <a:rPr lang="zh-CN" altLang="en-US" smtClean="0"/>
-              <a:t>2021/12/23</a:t>
+              <a:t>2023/10/8</a:t>
             </a:fld>
             <a:endParaRPr lang="zh-CN" altLang="en-US" dirty="0"/>
           </a:p>
@@ -1465,7 +1464,7 @@
           <a:p>
             <a:fld id="{760FBDFE-C587-4B4C-A407-44438C67B59E}" type="datetimeFigureOut">
               <a:rPr lang="zh-CN" altLang="en-US" smtClean="0"/>
-              <a:t>2021/12/23</a:t>
+              <a:t>2023/10/8</a:t>
             </a:fld>
             <a:endParaRPr lang="zh-CN" altLang="en-US"/>
           </a:p>
@@ -1638,7 +1637,7 @@
           <a:p>
             <a:fld id="{9EFD9D74-47D9-4702-A33C-335B63B48DBF}" type="datetimeFigureOut">
               <a:rPr lang="zh-CN" altLang="en-US" smtClean="0"/>
-              <a:t>2021/12/23</a:t>
+              <a:t>2023/10/8</a:t>
             </a:fld>
             <a:endParaRPr lang="zh-CN" altLang="en-US" dirty="0"/>
           </a:p>
@@ -2163,7 +2162,7 @@
           <a:p>
             <a:fld id="{760FBDFE-C587-4B4C-A407-44438C67B59E}" type="datetimeFigureOut">
               <a:rPr lang="zh-CN" altLang="en-US" smtClean="0"/>
-              <a:t>2021/12/23</a:t>
+              <a:t>2023/10/8</a:t>
             </a:fld>
             <a:endParaRPr lang="zh-CN" altLang="en-US"/>
           </a:p>
@@ -2911,7 +2910,7 @@
           <a:p>
             <a:fld id="{760FBDFE-C587-4B4C-A407-44438C67B59E}" type="datetimeFigureOut">
               <a:rPr lang="zh-CN" altLang="en-US" smtClean="0"/>
-              <a:t>2021/12/23</a:t>
+              <a:t>2023/10/8</a:t>
             </a:fld>
             <a:endParaRPr lang="zh-CN" altLang="en-US"/>
           </a:p>
@@ -3077,7 +3076,7 @@
           <a:p>
             <a:fld id="{760FBDFE-C587-4B4C-A407-44438C67B59E}" type="datetimeFigureOut">
               <a:rPr lang="zh-CN" altLang="en-US" smtClean="0"/>
-              <a:t>2021/12/23</a:t>
+              <a:t>2023/10/8</a:t>
             </a:fld>
             <a:endParaRPr lang="zh-CN" altLang="en-US"/>
           </a:p>
@@ -3191,7 +3190,7 @@
           <a:p>
             <a:fld id="{760FBDFE-C587-4B4C-A407-44438C67B59E}" type="datetimeFigureOut">
               <a:rPr lang="zh-CN" altLang="en-US" smtClean="0"/>
-              <a:t>2021/12/23</a:t>
+              <a:t>2023/10/8</a:t>
             </a:fld>
             <a:endParaRPr lang="zh-CN" altLang="en-US"/>
           </a:p>
@@ -3521,7 +3520,7 @@
           <a:p>
             <a:fld id="{9EFD9D74-47D9-4702-A33C-335B63B48DBF}" type="datetimeFigureOut">
               <a:rPr lang="zh-CN" altLang="en-US" smtClean="0"/>
-              <a:t>2021/12/23</a:t>
+              <a:t>2023/10/8</a:t>
             </a:fld>
             <a:endParaRPr lang="zh-CN" altLang="en-US" dirty="0"/>
           </a:p>
@@ -4034,7 +4033,7 @@
           <a:p>
             <a:fld id="{760FBDFE-C587-4B4C-A407-44438C67B59E}" type="datetimeFigureOut">
               <a:rPr lang="zh-CN" altLang="en-US" smtClean="0"/>
-              <a:t>2021/12/23</a:t>
+              <a:t>2023/10/8</a:t>
             </a:fld>
             <a:endParaRPr lang="zh-CN" altLang="en-US"/>
           </a:p>
@@ -4148,7 +4147,7 @@
           <a:p>
             <a:fld id="{760FBDFE-C587-4B4C-A407-44438C67B59E}" type="datetimeFigureOut">
               <a:rPr lang="zh-CN" altLang="en-US" smtClean="0"/>
-              <a:t>2021/12/23</a:t>
+              <a:t>2023/10/8</a:t>
             </a:fld>
             <a:endParaRPr lang="zh-CN" altLang="en-US"/>
           </a:p>
@@ -4671,7 +4670,7 @@
           <a:p>
             <a:fld id="{760FBDFE-C587-4B4C-A407-44438C67B59E}" type="datetimeFigureOut">
               <a:rPr lang="zh-CN" altLang="en-US" smtClean="0"/>
-              <a:t>2021/12/23</a:t>
+              <a:t>2023/10/8</a:t>
             </a:fld>
             <a:endParaRPr lang="zh-CN" altLang="en-US"/>
           </a:p>
@@ -5340,7 +5339,7 @@
           <a:p>
             <a:fld id="{9EFD9D74-47D9-4702-A33C-335B63B48DBF}" type="datetimeFigureOut">
               <a:rPr lang="zh-CN" altLang="en-US" smtClean="0"/>
-              <a:t>2021/12/23</a:t>
+              <a:t>2023/10/8</a:t>
             </a:fld>
             <a:endParaRPr lang="zh-CN" altLang="en-US" dirty="0"/>
           </a:p>
@@ -5488,7 +5487,7 @@
           <a:p>
             <a:fld id="{9EFD9D74-47D9-4702-A33C-335B63B48DBF}" type="datetimeFigureOut">
               <a:rPr lang="zh-CN" altLang="en-US" smtClean="0"/>
-              <a:t>2021/12/23</a:t>
+              <a:t>2023/10/8</a:t>
             </a:fld>
             <a:endParaRPr lang="zh-CN" altLang="en-US" dirty="0"/>
           </a:p>
@@ -5784,8 +5783,11 @@
   <p:cSld>
     <p:bg>
       <p:bgPr>
-        <a:blipFill rotWithShape="1">
-          <a:blip r:embed="rId24"/>
+        <a:blipFill dpi="0" rotWithShape="1">
+          <a:blip r:embed="rId24">
+            <a:lum/>
+          </a:blip>
+          <a:srcRect/>
           <a:stretch>
             <a:fillRect/>
           </a:stretch>
@@ -6254,22 +6256,34 @@
       </p:sp>
       <p:pic>
         <p:nvPicPr>
-          <p:cNvPr id="2" name="图片 1" descr="现代游戏引擎设计_背景_自定义px_2021-12-21+12_41_37"/>
+          <p:cNvPr id="4" name="图片 3">
+            <a:extLst>
+              <a:ext uri="{FF2B5EF4-FFF2-40B4-BE49-F238E27FC236}">
+                <a16:creationId xmlns:a16="http://schemas.microsoft.com/office/drawing/2014/main" id="{08055029-186A-18B9-BA4A-C85F65DC9591}"/>
+              </a:ext>
+            </a:extLst>
+          </p:cNvPr>
           <p:cNvPicPr>
             <a:picLocks noChangeAspect="1"/>
           </p:cNvPicPr>
           <p:nvPr/>
         </p:nvPicPr>
         <p:blipFill>
-          <a:blip r:embed="rId4"/>
+          <a:blip r:embed="rId4">
+            <a:extLst>
+              <a:ext uri="{28A0092B-C50C-407E-A947-70E740481C1C}">
+                <a14:useLocalDpi xmlns:a14="http://schemas.microsoft.com/office/drawing/2010/main" val="0"/>
+              </a:ext>
+            </a:extLst>
+          </a:blip>
           <a:stretch>
             <a:fillRect/>
           </a:stretch>
         </p:blipFill>
         <p:spPr>
           <a:xfrm>
-            <a:off x="0" y="-2540"/>
-            <a:ext cx="12192635" cy="6863080"/>
+            <a:off x="-1" y="0"/>
+            <a:ext cx="12249807" cy="6858000"/>
           </a:xfrm>
           <a:prstGeom prst="rect">
             <a:avLst/>
@@ -6320,8 +6334,10 @@
           <a:lstStyle/>
           <a:p>
             <a:r>
-              <a:t>学生提问考老师</a:t>
-            </a:r>
+              <a:rPr lang="zh-CN" altLang="en-US" dirty="0"/>
+              <a:t>问答</a:t>
+            </a:r>
+            <a:endParaRPr dirty="0"/>
           </a:p>
         </p:txBody>
       </p:sp>
@@ -6388,8 +6404,8 @@
           <a:lstStyle/>
           <a:p>
             <a:r>
-              <a:rPr lang="zh-CN" altLang="en-US"/>
-              <a:t>学生提问考老师</a:t>
+              <a:rPr lang="zh-CN" altLang="en-US" dirty="0"/>
+              <a:t>问答</a:t>
             </a:r>
           </a:p>
         </p:txBody>
@@ -6424,12 +6440,12 @@
       </p:grpSpPr>
       <p:sp>
         <p:nvSpPr>
-          <p:cNvPr id="2" name="标题 1"/>
-          <p:cNvSpPr>
-            <a:spLocks noGrp="1"/>
-          </p:cNvSpPr>
-          <p:nvPr>
-            <p:ph type="title"/>
+          <p:cNvPr id="2" name="文本占位符 1"/>
+          <p:cNvSpPr>
+            <a:spLocks noGrp="1"/>
+          </p:cNvSpPr>
+          <p:nvPr>
+            <p:ph type="body" idx="1"/>
           </p:nvPr>
         </p:nvSpPr>
         <p:spPr/>
@@ -6437,9 +6453,13 @@
           <a:bodyPr/>
           <a:lstStyle/>
           <a:p>
-            <a:r>
-              <a:t>老师提问考学生</a:t>
-            </a:r>
+            <a:pPr marL="285750" indent="-285750">
+              <a:buFont typeface="Arial" panose="020B0604020202090204" pitchFamily="34" charset="0"/>
+              <a:buChar char="•"/>
+            </a:pPr>
+            <a:endParaRPr>
+              <a:sym typeface="+mn-ea"/>
+            </a:endParaRPr>
           </a:p>
         </p:txBody>
       </p:sp>
@@ -6490,9 +6510,12 @@
               <a:buFont typeface="Arial" panose="020B0604020202090204" pitchFamily="34" charset="0"/>
               <a:buChar char="•"/>
             </a:pPr>
-            <a:endParaRPr>
-              <a:sym typeface="+mn-ea"/>
-            </a:endParaRPr>
+            <a:r>
+              <a:rPr>
+                <a:sym typeface="+mn-ea"/>
+              </a:rPr>
+              <a:t>无</a:t>
+            </a:r>
           </a:p>
         </p:txBody>
       </p:sp>
@@ -6544,10 +6567,30 @@
               <a:buChar char="•"/>
             </a:pPr>
             <a:r>
-              <a:rPr>
-                <a:sym typeface="+mn-ea"/>
-              </a:rPr>
+              <a:rPr lang="zh-CN" altLang="en-US"/>
               <a:t>无</a:t>
+            </a:r>
+          </a:p>
+        </p:txBody>
+      </p:sp>
+      <p:sp>
+        <p:nvSpPr>
+          <p:cNvPr id="3" name="标题 2"/>
+          <p:cNvSpPr>
+            <a:spLocks noGrp="1"/>
+          </p:cNvSpPr>
+          <p:nvPr>
+            <p:ph type="title"/>
+          </p:nvPr>
+        </p:nvSpPr>
+        <p:spPr/>
+        <p:txBody>
+          <a:bodyPr/>
+          <a:lstStyle/>
+          <a:p>
+            <a:r>
+              <a:rPr lang="zh-CN" altLang="en-US"/>
+              <a:t>作业</a:t>
             </a:r>
           </a:p>
         </p:txBody>
@@ -6599,10 +6642,7 @@
               <a:buFont typeface="Arial" panose="020B0604020202090204" pitchFamily="34" charset="0"/>
               <a:buChar char="•"/>
             </a:pPr>
-            <a:r>
-              <a:rPr lang="zh-CN" altLang="en-US"/>
-              <a:t>无</a:t>
-            </a:r>
+            <a:endParaRPr/>
           </a:p>
         </p:txBody>
       </p:sp>
@@ -6623,7 +6663,7 @@
           <a:p>
             <a:r>
               <a:rPr lang="zh-CN" altLang="en-US"/>
-              <a:t>作业</a:t>
+              <a:t>下节课预告</a:t>
             </a:r>
           </a:p>
         </p:txBody>
@@ -6640,79 +6680,6 @@
 </file>
 
 <file path=ppt/slides/slide16.xml><?xml version="1.0" encoding="utf-8"?>
-<p:sld xmlns:a="http://schemas.openxmlformats.org/drawingml/2006/main" xmlns:r="http://schemas.openxmlformats.org/officeDocument/2006/relationships" xmlns:p="http://schemas.openxmlformats.org/presentationml/2006/main">
-  <p:cSld>
-    <p:spTree>
-      <p:nvGrpSpPr>
-        <p:cNvPr id="1" name=""/>
-        <p:cNvGrpSpPr/>
-        <p:nvPr/>
-      </p:nvGrpSpPr>
-      <p:grpSpPr>
-        <a:xfrm>
-          <a:off x="0" y="0"/>
-          <a:ext cx="0" cy="0"/>
-          <a:chOff x="0" y="0"/>
-          <a:chExt cx="0" cy="0"/>
-        </a:xfrm>
-      </p:grpSpPr>
-      <p:sp>
-        <p:nvSpPr>
-          <p:cNvPr id="2" name="文本占位符 1"/>
-          <p:cNvSpPr>
-            <a:spLocks noGrp="1"/>
-          </p:cNvSpPr>
-          <p:nvPr>
-            <p:ph type="body" idx="1"/>
-          </p:nvPr>
-        </p:nvSpPr>
-        <p:spPr/>
-        <p:txBody>
-          <a:bodyPr/>
-          <a:lstStyle/>
-          <a:p>
-            <a:pPr marL="285750" indent="-285750">
-              <a:buFont typeface="Arial" panose="020B0604020202090204" pitchFamily="34" charset="0"/>
-              <a:buChar char="•"/>
-            </a:pPr>
-            <a:endParaRPr/>
-          </a:p>
-        </p:txBody>
-      </p:sp>
-      <p:sp>
-        <p:nvSpPr>
-          <p:cNvPr id="3" name="标题 2"/>
-          <p:cNvSpPr>
-            <a:spLocks noGrp="1"/>
-          </p:cNvSpPr>
-          <p:nvPr>
-            <p:ph type="title"/>
-          </p:nvPr>
-        </p:nvSpPr>
-        <p:spPr/>
-        <p:txBody>
-          <a:bodyPr/>
-          <a:lstStyle/>
-          <a:p>
-            <a:r>
-              <a:rPr lang="zh-CN" altLang="en-US"/>
-              <a:t>下节课预告</a:t>
-            </a:r>
-          </a:p>
-        </p:txBody>
-      </p:sp>
-    </p:spTree>
-    <p:custDataLst>
-      <p:tags r:id="rId1"/>
-    </p:custDataLst>
-  </p:cSld>
-  <p:clrMapOvr>
-    <a:masterClrMapping/>
-  </p:clrMapOvr>
-</p:sld>
-</file>
-
-<file path=ppt/slides/slide17.xml><?xml version="1.0" encoding="utf-8"?>
 <p:sld xmlns:a="http://schemas.openxmlformats.org/drawingml/2006/main" xmlns:r="http://schemas.openxmlformats.org/officeDocument/2006/relationships" xmlns:p="http://schemas.openxmlformats.org/presentationml/2006/main">
   <p:cSld>
     <p:spTree>
@@ -6981,6 +6948,246 @@
           </a:p>
         </p:txBody>
       </p:sp>
+      <p:sp>
+        <p:nvSpPr>
+          <p:cNvPr id="5" name="文本占位符 1">
+            <a:extLst>
+              <a:ext uri="{FF2B5EF4-FFF2-40B4-BE49-F238E27FC236}">
+                <a16:creationId xmlns:a16="http://schemas.microsoft.com/office/drawing/2014/main" id="{E4058E1D-33E8-562B-CA88-EACDE0D9E7E9}"/>
+              </a:ext>
+            </a:extLst>
+          </p:cNvPr>
+          <p:cNvSpPr txBox="1">
+            <a:spLocks/>
+          </p:cNvSpPr>
+          <p:nvPr/>
+        </p:nvSpPr>
+        <p:spPr>
+          <a:xfrm>
+            <a:off x="669925" y="1289551"/>
+            <a:ext cx="10852150" cy="4890270"/>
+          </a:xfrm>
+        </p:spPr>
+        <p:txBody>
+          <a:bodyPr lIns="101600" tIns="38100" rIns="76200" bIns="38100">
+            <a:noAutofit/>
+          </a:bodyPr>
+          <a:lstStyle>
+            <a:lvl1pPr marL="0" indent="0" algn="l" defTabSz="914400" rtl="0" eaLnBrk="1" fontAlgn="auto" latinLnBrk="0" hangingPunct="1">
+              <a:lnSpc>
+                <a:spcPct val="130000"/>
+              </a:lnSpc>
+              <a:spcBef>
+                <a:spcPts val="0"/>
+              </a:spcBef>
+              <a:spcAft>
+                <a:spcPts val="1000"/>
+              </a:spcAft>
+              <a:buFont typeface="Arial" panose="020B0604020202090204" pitchFamily="34" charset="0"/>
+              <a:buNone/>
+              <a:defRPr kumimoji="0" lang="zh-CN" altLang="en-US" sz="1600" b="0" i="0" u="none" strike="noStrike" kern="1200" cap="none" spc="150" normalizeH="0" baseline="0" noProof="1">
+                <a:solidFill>
+                  <a:schemeClr val="tx1"/>
+                </a:solidFill>
+                <a:uFillTx/>
+                <a:latin typeface="+mn-lt"/>
+                <a:ea typeface="+mn-ea"/>
+                <a:cs typeface="+mn-cs"/>
+                <a:sym typeface="+mn-ea"/>
+              </a:defRPr>
+            </a:lvl1pPr>
+            <a:lvl2pPr marL="457200" indent="0" algn="l" defTabSz="914400" rtl="0" eaLnBrk="1" fontAlgn="auto" latinLnBrk="0" hangingPunct="1">
+              <a:lnSpc>
+                <a:spcPct val="130000"/>
+              </a:lnSpc>
+              <a:spcBef>
+                <a:spcPts val="0"/>
+              </a:spcBef>
+              <a:spcAft>
+                <a:spcPts val="1000"/>
+              </a:spcAft>
+              <a:buFont typeface="Arial" panose="020B0604020202090204" pitchFamily="34" charset="0"/>
+              <a:buNone/>
+              <a:tabLst>
+                <a:tab pos="1609725" algn="l"/>
+              </a:tabLst>
+              <a:defRPr sz="2000" u="none" strike="noStrike" kern="1200" cap="none" spc="150" normalizeH="0" baseline="0">
+                <a:solidFill>
+                  <a:schemeClr val="tx1">
+                    <a:tint val="75000"/>
+                  </a:schemeClr>
+                </a:solidFill>
+                <a:uFillTx/>
+                <a:latin typeface="+mn-lt"/>
+                <a:ea typeface="+mn-ea"/>
+                <a:cs typeface="+mn-cs"/>
+              </a:defRPr>
+            </a:lvl2pPr>
+            <a:lvl3pPr marL="914400" indent="0" algn="l" defTabSz="914400" rtl="0" eaLnBrk="1" fontAlgn="auto" latinLnBrk="0" hangingPunct="1">
+              <a:lnSpc>
+                <a:spcPct val="130000"/>
+              </a:lnSpc>
+              <a:spcBef>
+                <a:spcPts val="0"/>
+              </a:spcBef>
+              <a:spcAft>
+                <a:spcPts val="1000"/>
+              </a:spcAft>
+              <a:buFont typeface="Arial" panose="020B0604020202090204" pitchFamily="34" charset="0"/>
+              <a:buNone/>
+              <a:defRPr sz="1800" u="none" strike="noStrike" kern="1200" cap="none" spc="150" normalizeH="0" baseline="0">
+                <a:solidFill>
+                  <a:schemeClr val="tx1">
+                    <a:tint val="75000"/>
+                  </a:schemeClr>
+                </a:solidFill>
+                <a:uFillTx/>
+                <a:latin typeface="+mn-lt"/>
+                <a:ea typeface="+mn-ea"/>
+                <a:cs typeface="+mn-cs"/>
+              </a:defRPr>
+            </a:lvl3pPr>
+            <a:lvl4pPr marL="1371600" indent="0" algn="l" defTabSz="914400" rtl="0" eaLnBrk="1" fontAlgn="auto" latinLnBrk="0" hangingPunct="1">
+              <a:lnSpc>
+                <a:spcPct val="130000"/>
+              </a:lnSpc>
+              <a:spcBef>
+                <a:spcPts val="0"/>
+              </a:spcBef>
+              <a:spcAft>
+                <a:spcPts val="1000"/>
+              </a:spcAft>
+              <a:buFont typeface="Arial" panose="020B0604020202090204" pitchFamily="34" charset="0"/>
+              <a:buNone/>
+              <a:defRPr sz="1600" u="none" strike="noStrike" kern="1200" cap="none" spc="150" normalizeH="0" baseline="0">
+                <a:solidFill>
+                  <a:schemeClr val="tx1">
+                    <a:tint val="75000"/>
+                  </a:schemeClr>
+                </a:solidFill>
+                <a:uFillTx/>
+                <a:latin typeface="+mn-lt"/>
+                <a:ea typeface="+mn-ea"/>
+                <a:cs typeface="+mn-cs"/>
+              </a:defRPr>
+            </a:lvl4pPr>
+            <a:lvl5pPr marL="1828800" indent="0" algn="l" defTabSz="914400" rtl="0" eaLnBrk="1" fontAlgn="auto" latinLnBrk="0" hangingPunct="1">
+              <a:lnSpc>
+                <a:spcPct val="130000"/>
+              </a:lnSpc>
+              <a:spcBef>
+                <a:spcPts val="0"/>
+              </a:spcBef>
+              <a:spcAft>
+                <a:spcPts val="1000"/>
+              </a:spcAft>
+              <a:buFont typeface="Arial" panose="020B0604020202090204" pitchFamily="34" charset="0"/>
+              <a:buNone/>
+              <a:defRPr sz="1600" u="none" strike="noStrike" kern="1200" cap="none" spc="150" normalizeH="0" baseline="0">
+                <a:solidFill>
+                  <a:schemeClr val="tx1">
+                    <a:tint val="75000"/>
+                  </a:schemeClr>
+                </a:solidFill>
+                <a:uFillTx/>
+                <a:latin typeface="+mn-lt"/>
+                <a:ea typeface="+mn-ea"/>
+                <a:cs typeface="+mn-cs"/>
+              </a:defRPr>
+            </a:lvl5pPr>
+            <a:lvl6pPr marL="2286000" indent="0" algn="l" defTabSz="914400" rtl="0" eaLnBrk="1" latinLnBrk="0" hangingPunct="1">
+              <a:lnSpc>
+                <a:spcPct val="90000"/>
+              </a:lnSpc>
+              <a:spcBef>
+                <a:spcPts val="500"/>
+              </a:spcBef>
+              <a:buFont typeface="Arial" panose="020B0604020202090204" pitchFamily="34" charset="0"/>
+              <a:buNone/>
+              <a:defRPr sz="1600" kern="1200">
+                <a:solidFill>
+                  <a:schemeClr val="tx1">
+                    <a:tint val="75000"/>
+                  </a:schemeClr>
+                </a:solidFill>
+                <a:latin typeface="+mn-lt"/>
+                <a:ea typeface="+mn-ea"/>
+                <a:cs typeface="+mn-cs"/>
+              </a:defRPr>
+            </a:lvl6pPr>
+            <a:lvl7pPr marL="2743200" indent="0" algn="l" defTabSz="914400" rtl="0" eaLnBrk="1" latinLnBrk="0" hangingPunct="1">
+              <a:lnSpc>
+                <a:spcPct val="90000"/>
+              </a:lnSpc>
+              <a:spcBef>
+                <a:spcPts val="500"/>
+              </a:spcBef>
+              <a:buFont typeface="Arial" panose="020B0604020202090204" pitchFamily="34" charset="0"/>
+              <a:buNone/>
+              <a:defRPr sz="1600" kern="1200">
+                <a:solidFill>
+                  <a:schemeClr val="tx1">
+                    <a:tint val="75000"/>
+                  </a:schemeClr>
+                </a:solidFill>
+                <a:latin typeface="+mn-lt"/>
+                <a:ea typeface="+mn-ea"/>
+                <a:cs typeface="+mn-cs"/>
+              </a:defRPr>
+            </a:lvl7pPr>
+            <a:lvl8pPr marL="3200400" indent="0" algn="l" defTabSz="914400" rtl="0" eaLnBrk="1" latinLnBrk="0" hangingPunct="1">
+              <a:lnSpc>
+                <a:spcPct val="90000"/>
+              </a:lnSpc>
+              <a:spcBef>
+                <a:spcPts val="500"/>
+              </a:spcBef>
+              <a:buFont typeface="Arial" panose="020B0604020202090204" pitchFamily="34" charset="0"/>
+              <a:buNone/>
+              <a:defRPr sz="1600" kern="1200">
+                <a:solidFill>
+                  <a:schemeClr val="tx1">
+                    <a:tint val="75000"/>
+                  </a:schemeClr>
+                </a:solidFill>
+                <a:latin typeface="+mn-lt"/>
+                <a:ea typeface="+mn-ea"/>
+                <a:cs typeface="+mn-cs"/>
+              </a:defRPr>
+            </a:lvl8pPr>
+            <a:lvl9pPr marL="3657600" indent="0" algn="l" defTabSz="914400" rtl="0" eaLnBrk="1" latinLnBrk="0" hangingPunct="1">
+              <a:lnSpc>
+                <a:spcPct val="90000"/>
+              </a:lnSpc>
+              <a:spcBef>
+                <a:spcPts val="500"/>
+              </a:spcBef>
+              <a:buFont typeface="Arial" panose="020B0604020202090204" pitchFamily="34" charset="0"/>
+              <a:buNone/>
+              <a:defRPr sz="1600" kern="1200">
+                <a:solidFill>
+                  <a:schemeClr val="tx1">
+                    <a:tint val="75000"/>
+                  </a:schemeClr>
+                </a:solidFill>
+                <a:latin typeface="+mn-lt"/>
+                <a:ea typeface="+mn-ea"/>
+                <a:cs typeface="+mn-cs"/>
+              </a:defRPr>
+            </a:lvl9pPr>
+          </a:lstStyle>
+          <a:p>
+            <a:pPr marL="285750" indent="-285750">
+              <a:buFont typeface="Arial" panose="020B0604020202090204" pitchFamily="34" charset="0"/>
+              <a:buChar char="•"/>
+            </a:pPr>
+            <a:br>
+              <a:rPr lang="zh-CN" altLang="en-US" dirty="0"/>
+            </a:br>
+            <a:endParaRPr lang="zh-CN" altLang="en-US" dirty="0"/>
+          </a:p>
+        </p:txBody>
+      </p:sp>
     </p:spTree>
     <p:custDataLst>
       <p:tags r:id="rId1"/>
@@ -7068,106 +7275,292 @@
       </p:grpSpPr>
       <p:sp>
         <p:nvSpPr>
-          <p:cNvPr id="2" name="文本占位符 1"/>
-          <p:cNvSpPr>
-            <a:spLocks noGrp="1"/>
-          </p:cNvSpPr>
-          <p:nvPr>
-            <p:ph type="body" idx="1"/>
+          <p:cNvPr id="3" name="标题 2"/>
+          <p:cNvSpPr>
+            <a:spLocks noGrp="1"/>
+          </p:cNvSpPr>
+          <p:nvPr>
+            <p:ph type="title"/>
           </p:nvPr>
         </p:nvSpPr>
         <p:spPr/>
         <p:txBody>
           <a:bodyPr/>
           <a:lstStyle/>
+          <a:p>
+            <a:r>
+              <a:rPr>
+                <a:sym typeface="+mn-ea"/>
+              </a:rPr>
+              <a:t>主问题：</a:t>
+            </a:r>
+            <a:endParaRPr lang="zh-CN" altLang="en-US"/>
+          </a:p>
+        </p:txBody>
+      </p:sp>
+      <p:sp>
+        <p:nvSpPr>
+          <p:cNvPr id="6" name="文本占位符 1">
+            <a:extLst>
+              <a:ext uri="{FF2B5EF4-FFF2-40B4-BE49-F238E27FC236}">
+                <a16:creationId xmlns:a16="http://schemas.microsoft.com/office/drawing/2014/main" id="{1DFBF6D3-4771-F552-24C8-73DBE39EB343}"/>
+              </a:ext>
+            </a:extLst>
+          </p:cNvPr>
+          <p:cNvSpPr txBox="1">
+            <a:spLocks/>
+          </p:cNvSpPr>
+          <p:nvPr/>
+        </p:nvSpPr>
+        <p:spPr>
+          <a:xfrm>
+            <a:off x="669925" y="1289551"/>
+            <a:ext cx="10852150" cy="4890270"/>
+          </a:xfrm>
+        </p:spPr>
+        <p:txBody>
+          <a:bodyPr lIns="101600" tIns="38100" rIns="76200" bIns="38100">
+            <a:noAutofit/>
+          </a:bodyPr>
+          <a:lstStyle>
+            <a:lvl1pPr marL="0" indent="0" algn="l" defTabSz="914400" rtl="0" eaLnBrk="1" fontAlgn="auto" latinLnBrk="0" hangingPunct="1">
+              <a:lnSpc>
+                <a:spcPct val="130000"/>
+              </a:lnSpc>
+              <a:spcBef>
+                <a:spcPts val="0"/>
+              </a:spcBef>
+              <a:spcAft>
+                <a:spcPts val="1000"/>
+              </a:spcAft>
+              <a:buFont typeface="Arial" panose="020B0604020202090204" pitchFamily="34" charset="0"/>
+              <a:buNone/>
+              <a:defRPr kumimoji="0" lang="zh-CN" altLang="en-US" sz="1600" b="0" i="0" u="none" strike="noStrike" kern="1200" cap="none" spc="150" normalizeH="0" baseline="0" noProof="1">
+                <a:solidFill>
+                  <a:schemeClr val="tx1"/>
+                </a:solidFill>
+                <a:uFillTx/>
+                <a:latin typeface="+mn-lt"/>
+                <a:ea typeface="+mn-ea"/>
+                <a:cs typeface="+mn-cs"/>
+                <a:sym typeface="+mn-ea"/>
+              </a:defRPr>
+            </a:lvl1pPr>
+            <a:lvl2pPr marL="457200" indent="0" algn="l" defTabSz="914400" rtl="0" eaLnBrk="1" fontAlgn="auto" latinLnBrk="0" hangingPunct="1">
+              <a:lnSpc>
+                <a:spcPct val="130000"/>
+              </a:lnSpc>
+              <a:spcBef>
+                <a:spcPts val="0"/>
+              </a:spcBef>
+              <a:spcAft>
+                <a:spcPts val="1000"/>
+              </a:spcAft>
+              <a:buFont typeface="Arial" panose="020B0604020202090204" pitchFamily="34" charset="0"/>
+              <a:buNone/>
+              <a:tabLst>
+                <a:tab pos="1609725" algn="l"/>
+              </a:tabLst>
+              <a:defRPr sz="2000" u="none" strike="noStrike" kern="1200" cap="none" spc="150" normalizeH="0" baseline="0">
+                <a:solidFill>
+                  <a:schemeClr val="tx1">
+                    <a:tint val="75000"/>
+                  </a:schemeClr>
+                </a:solidFill>
+                <a:uFillTx/>
+                <a:latin typeface="+mn-lt"/>
+                <a:ea typeface="+mn-ea"/>
+                <a:cs typeface="+mn-cs"/>
+              </a:defRPr>
+            </a:lvl2pPr>
+            <a:lvl3pPr marL="914400" indent="0" algn="l" defTabSz="914400" rtl="0" eaLnBrk="1" fontAlgn="auto" latinLnBrk="0" hangingPunct="1">
+              <a:lnSpc>
+                <a:spcPct val="130000"/>
+              </a:lnSpc>
+              <a:spcBef>
+                <a:spcPts val="0"/>
+              </a:spcBef>
+              <a:spcAft>
+                <a:spcPts val="1000"/>
+              </a:spcAft>
+              <a:buFont typeface="Arial" panose="020B0604020202090204" pitchFamily="34" charset="0"/>
+              <a:buNone/>
+              <a:defRPr sz="1800" u="none" strike="noStrike" kern="1200" cap="none" spc="150" normalizeH="0" baseline="0">
+                <a:solidFill>
+                  <a:schemeClr val="tx1">
+                    <a:tint val="75000"/>
+                  </a:schemeClr>
+                </a:solidFill>
+                <a:uFillTx/>
+                <a:latin typeface="+mn-lt"/>
+                <a:ea typeface="+mn-ea"/>
+                <a:cs typeface="+mn-cs"/>
+              </a:defRPr>
+            </a:lvl3pPr>
+            <a:lvl4pPr marL="1371600" indent="0" algn="l" defTabSz="914400" rtl="0" eaLnBrk="1" fontAlgn="auto" latinLnBrk="0" hangingPunct="1">
+              <a:lnSpc>
+                <a:spcPct val="130000"/>
+              </a:lnSpc>
+              <a:spcBef>
+                <a:spcPts val="0"/>
+              </a:spcBef>
+              <a:spcAft>
+                <a:spcPts val="1000"/>
+              </a:spcAft>
+              <a:buFont typeface="Arial" panose="020B0604020202090204" pitchFamily="34" charset="0"/>
+              <a:buNone/>
+              <a:defRPr sz="1600" u="none" strike="noStrike" kern="1200" cap="none" spc="150" normalizeH="0" baseline="0">
+                <a:solidFill>
+                  <a:schemeClr val="tx1">
+                    <a:tint val="75000"/>
+                  </a:schemeClr>
+                </a:solidFill>
+                <a:uFillTx/>
+                <a:latin typeface="+mn-lt"/>
+                <a:ea typeface="+mn-ea"/>
+                <a:cs typeface="+mn-cs"/>
+              </a:defRPr>
+            </a:lvl4pPr>
+            <a:lvl5pPr marL="1828800" indent="0" algn="l" defTabSz="914400" rtl="0" eaLnBrk="1" fontAlgn="auto" latinLnBrk="0" hangingPunct="1">
+              <a:lnSpc>
+                <a:spcPct val="130000"/>
+              </a:lnSpc>
+              <a:spcBef>
+                <a:spcPts val="0"/>
+              </a:spcBef>
+              <a:spcAft>
+                <a:spcPts val="1000"/>
+              </a:spcAft>
+              <a:buFont typeface="Arial" panose="020B0604020202090204" pitchFamily="34" charset="0"/>
+              <a:buNone/>
+              <a:defRPr sz="1600" u="none" strike="noStrike" kern="1200" cap="none" spc="150" normalizeH="0" baseline="0">
+                <a:solidFill>
+                  <a:schemeClr val="tx1">
+                    <a:tint val="75000"/>
+                  </a:schemeClr>
+                </a:solidFill>
+                <a:uFillTx/>
+                <a:latin typeface="+mn-lt"/>
+                <a:ea typeface="+mn-ea"/>
+                <a:cs typeface="+mn-cs"/>
+              </a:defRPr>
+            </a:lvl5pPr>
+            <a:lvl6pPr marL="2286000" indent="0" algn="l" defTabSz="914400" rtl="0" eaLnBrk="1" latinLnBrk="0" hangingPunct="1">
+              <a:lnSpc>
+                <a:spcPct val="90000"/>
+              </a:lnSpc>
+              <a:spcBef>
+                <a:spcPts val="500"/>
+              </a:spcBef>
+              <a:buFont typeface="Arial" panose="020B0604020202090204" pitchFamily="34" charset="0"/>
+              <a:buNone/>
+              <a:defRPr sz="1600" kern="1200">
+                <a:solidFill>
+                  <a:schemeClr val="tx1">
+                    <a:tint val="75000"/>
+                  </a:schemeClr>
+                </a:solidFill>
+                <a:latin typeface="+mn-lt"/>
+                <a:ea typeface="+mn-ea"/>
+                <a:cs typeface="+mn-cs"/>
+              </a:defRPr>
+            </a:lvl6pPr>
+            <a:lvl7pPr marL="2743200" indent="0" algn="l" defTabSz="914400" rtl="0" eaLnBrk="1" latinLnBrk="0" hangingPunct="1">
+              <a:lnSpc>
+                <a:spcPct val="90000"/>
+              </a:lnSpc>
+              <a:spcBef>
+                <a:spcPts val="500"/>
+              </a:spcBef>
+              <a:buFont typeface="Arial" panose="020B0604020202090204" pitchFamily="34" charset="0"/>
+              <a:buNone/>
+              <a:defRPr sz="1600" kern="1200">
+                <a:solidFill>
+                  <a:schemeClr val="tx1">
+                    <a:tint val="75000"/>
+                  </a:schemeClr>
+                </a:solidFill>
+                <a:latin typeface="+mn-lt"/>
+                <a:ea typeface="+mn-ea"/>
+                <a:cs typeface="+mn-cs"/>
+              </a:defRPr>
+            </a:lvl7pPr>
+            <a:lvl8pPr marL="3200400" indent="0" algn="l" defTabSz="914400" rtl="0" eaLnBrk="1" latinLnBrk="0" hangingPunct="1">
+              <a:lnSpc>
+                <a:spcPct val="90000"/>
+              </a:lnSpc>
+              <a:spcBef>
+                <a:spcPts val="500"/>
+              </a:spcBef>
+              <a:buFont typeface="Arial" panose="020B0604020202090204" pitchFamily="34" charset="0"/>
+              <a:buNone/>
+              <a:defRPr sz="1600" kern="1200">
+                <a:solidFill>
+                  <a:schemeClr val="tx1">
+                    <a:tint val="75000"/>
+                  </a:schemeClr>
+                </a:solidFill>
+                <a:latin typeface="+mn-lt"/>
+                <a:ea typeface="+mn-ea"/>
+                <a:cs typeface="+mn-cs"/>
+              </a:defRPr>
+            </a:lvl8pPr>
+            <a:lvl9pPr marL="3657600" indent="0" algn="l" defTabSz="914400" rtl="0" eaLnBrk="1" latinLnBrk="0" hangingPunct="1">
+              <a:lnSpc>
+                <a:spcPct val="90000"/>
+              </a:lnSpc>
+              <a:spcBef>
+                <a:spcPts val="500"/>
+              </a:spcBef>
+              <a:buFont typeface="Arial" panose="020B0604020202090204" pitchFamily="34" charset="0"/>
+              <a:buNone/>
+              <a:defRPr sz="1600" kern="1200">
+                <a:solidFill>
+                  <a:schemeClr val="tx1">
+                    <a:tint val="75000"/>
+                  </a:schemeClr>
+                </a:solidFill>
+                <a:latin typeface="+mn-lt"/>
+                <a:ea typeface="+mn-ea"/>
+                <a:cs typeface="+mn-cs"/>
+              </a:defRPr>
+            </a:lvl9pPr>
+          </a:lstStyle>
           <a:p>
             <a:pPr marL="285750" indent="-285750">
               <a:buFont typeface="Arial" panose="020B0604020202090204" pitchFamily="34" charset="0"/>
               <a:buChar char="•"/>
             </a:pPr>
-            <a:endParaRPr>
-              <a:sym typeface="+mn-ea"/>
-            </a:endParaRPr>
-          </a:p>
-          <a:p>
-            <a:pPr marL="285750" indent="-285750">
-              <a:buFont typeface="Arial" panose="020B0604020202090204" pitchFamily="34" charset="0"/>
-              <a:buChar char="•"/>
-            </a:pPr>
-            <a:r>
-              <a:rPr>
-                <a:sym typeface="+mn-ea"/>
-              </a:rPr>
+            <a:r>
+              <a:rPr lang="zh-CN" altLang="en-US"/>
               <a:t>开始回答</a:t>
             </a:r>
             <a:br>
-              <a:rPr>
-                <a:sym typeface="+mn-ea"/>
-              </a:rPr>
+              <a:rPr lang="zh-CN" altLang="en-US"/>
             </a:br>
             <a:r>
-              <a:rPr lang="en-US" altLang="zh-CN">
-                <a:sym typeface="+mn-ea"/>
-              </a:rPr>
+              <a:rPr lang="en-US" altLang="zh-CN"/>
               <a:t>- </a:t>
             </a:r>
             <a:r>
-              <a:rPr>
-                <a:sym typeface="+mn-ea"/>
-              </a:rPr>
+              <a:rPr lang="zh-CN" altLang="en-US"/>
               <a:t>自学</a:t>
             </a:r>
             <a:br>
-              <a:rPr>
-                <a:sym typeface="+mn-ea"/>
-              </a:rPr>
+              <a:rPr lang="zh-CN" altLang="en-US"/>
             </a:br>
             <a:r>
-              <a:rPr lang="en-US" altLang="zh-CN">
-                <a:sym typeface="+mn-ea"/>
-              </a:rPr>
+              <a:rPr lang="en-US" altLang="zh-CN"/>
               <a:t>- </a:t>
             </a:r>
             <a:r>
-              <a:rPr>
-                <a:sym typeface="+mn-ea"/>
-              </a:rPr>
+              <a:rPr lang="zh-CN" altLang="en-US"/>
               <a:t>展学</a:t>
             </a:r>
-          </a:p>
-          <a:p>
-            <a:pPr marL="285750" indent="-285750">
-              <a:buFont typeface="Arial" panose="020B0604020202090204" pitchFamily="34" charset="0"/>
-              <a:buChar char="•"/>
-            </a:pPr>
-            <a:endParaRPr>
-              <a:sym typeface="+mn-ea"/>
-            </a:endParaRPr>
-          </a:p>
-        </p:txBody>
-      </p:sp>
-      <p:sp>
-        <p:nvSpPr>
-          <p:cNvPr id="3" name="标题 2"/>
-          <p:cNvSpPr>
-            <a:spLocks noGrp="1"/>
-          </p:cNvSpPr>
-          <p:nvPr>
-            <p:ph type="title"/>
-          </p:nvPr>
-        </p:nvSpPr>
-        <p:spPr/>
-        <p:txBody>
-          <a:bodyPr/>
-          <a:lstStyle/>
-          <a:p>
-            <a:r>
-              <a:rPr>
-                <a:sym typeface="+mn-ea"/>
-              </a:rPr>
-              <a:t>主问题：</a:t>
-            </a:r>
-            <a:endParaRPr lang="zh-CN" altLang="en-US"/>
+            <a:br>
+              <a:rPr lang="zh-CN" altLang="en-US"/>
+            </a:br>
+            <a:endParaRPr lang="zh-CN" altLang="en-US" dirty="0"/>
           </a:p>
         </p:txBody>
       </p:sp>
@@ -7209,7 +7602,12 @@
             <p:ph type="body" idx="1"/>
           </p:nvPr>
         </p:nvSpPr>
-        <p:spPr/>
+        <p:spPr>
+          <a:xfrm>
+            <a:off x="669925" y="1289551"/>
+            <a:ext cx="10852150" cy="4890270"/>
+          </a:xfrm>
+        </p:spPr>
         <p:txBody>
           <a:bodyPr/>
           <a:lstStyle/>
@@ -7218,61 +7616,52 @@
               <a:buFont typeface="Arial" panose="020B0604020202090204" pitchFamily="34" charset="0"/>
               <a:buChar char="•"/>
             </a:pPr>
-            <a:endParaRPr>
-              <a:sym typeface="+mn-ea"/>
-            </a:endParaRPr>
-          </a:p>
-          <a:p>
-            <a:pPr marL="285750" indent="-285750">
-              <a:buFont typeface="Arial" panose="020B0604020202090204" pitchFamily="34" charset="0"/>
-              <a:buChar char="•"/>
-            </a:pPr>
-            <a:r>
-              <a:rPr>
+            <a:r>
+              <a:rPr dirty="0">
                 <a:sym typeface="+mn-ea"/>
               </a:rPr>
               <a:t>开始回答</a:t>
             </a:r>
             <a:br>
-              <a:rPr>
+              <a:rPr dirty="0">
                 <a:sym typeface="+mn-ea"/>
               </a:rPr>
             </a:br>
             <a:r>
-              <a:rPr lang="en-US" altLang="zh-CN">
+              <a:rPr lang="en-US" altLang="zh-CN" dirty="0">
                 <a:sym typeface="+mn-ea"/>
               </a:rPr>
               <a:t>- </a:t>
             </a:r>
             <a:r>
-              <a:rPr>
+              <a:rPr dirty="0">
                 <a:sym typeface="+mn-ea"/>
               </a:rPr>
               <a:t>自学</a:t>
             </a:r>
             <a:br>
-              <a:rPr>
+              <a:rPr dirty="0">
                 <a:sym typeface="+mn-ea"/>
               </a:rPr>
             </a:br>
             <a:r>
-              <a:rPr lang="en-US" altLang="zh-CN">
+              <a:rPr lang="en-US" altLang="zh-CN" dirty="0">
                 <a:sym typeface="+mn-ea"/>
               </a:rPr>
               <a:t>- </a:t>
             </a:r>
             <a:r>
-              <a:rPr>
+              <a:rPr dirty="0">
                 <a:sym typeface="+mn-ea"/>
               </a:rPr>
               <a:t>展学</a:t>
             </a:r>
             <a:br>
-              <a:rPr>
+              <a:rPr dirty="0">
                 <a:sym typeface="+mn-ea"/>
               </a:rPr>
             </a:br>
-            <a:endParaRPr>
+            <a:endParaRPr dirty="0">
               <a:sym typeface="+mn-ea"/>
             </a:endParaRPr>
           </a:p>
@@ -7546,12 +7935,12 @@
           <a:graphicData uri="http://schemas.openxmlformats.org/presentationml/2006/ole">
             <mc:AlternateContent xmlns:mc="http://schemas.openxmlformats.org/markup-compatibility/2006">
               <mc:Choice xmlns:v="urn:schemas-microsoft-com:vml" Requires="v">
-                <p:oleObj spid="_x0000_s4101" r:id="rId4" imgW="914400" imgH="368300" progId="Equation.KSEE3">
+                <p:oleObj r:id="rId3" imgW="914400" imgH="368300" progId="Equation.KSEE3">
                   <p:embed/>
                 </p:oleObj>
               </mc:Choice>
               <mc:Fallback>
-                <p:oleObj r:id="rId4" imgW="914400" imgH="368300" progId="Equation.KSEE3">
+                <p:oleObj r:id="rId3" imgW="914400" imgH="368300" progId="Equation.KSEE3">
                   <p:embed/>
                   <p:pic>
                     <p:nvPicPr>
@@ -7560,7 +7949,7 @@
                       <p:nvPr/>
                     </p:nvPicPr>
                     <p:blipFill>
-                      <a:blip r:embed="rId5"/>
+                      <a:blip r:embed="rId4"/>
                       <a:stretch>
                         <a:fillRect/>
                       </a:stretch>
@@ -7583,7 +7972,7 @@
       </p:graphicFrame>
     </p:spTree>
     <p:custDataLst>
-      <p:tags r:id="rId2"/>
+      <p:tags r:id="rId1"/>
     </p:custDataLst>
   </p:cSld>
   <p:clrMapOvr>
@@ -8594,15 +8983,6 @@
 </file>
 
 <file path=ppt/tags/tag83.xml><?xml version="1.0" encoding="utf-8"?>
-<p:tagLst xmlns:a="http://schemas.openxmlformats.org/drawingml/2006/main" xmlns:r="http://schemas.openxmlformats.org/officeDocument/2006/relationships" xmlns:p="http://schemas.openxmlformats.org/presentationml/2006/main">
-  <p:tag name="KSO_WM_BEAUTIFY_FLAG" val="#wm#"/>
-  <p:tag name="KSO_WM_TEMPLATE_CATEGORY" val="custom"/>
-  <p:tag name="KSO_WM_TEMPLATE_INDEX" val="20187308"/>
-  <p:tag name="KSO_WM_SPECIAL_SOURCE" val="bdnull"/>
-</p:tagLst>
-</file>
-
-<file path=ppt/tags/tag84.xml><?xml version="1.0" encoding="utf-8"?>
 <p:tagLst xmlns:a="http://schemas.openxmlformats.org/drawingml/2006/main" xmlns:r="http://schemas.openxmlformats.org/officeDocument/2006/relationships" xmlns:p="http://schemas.openxmlformats.org/presentationml/2006/main">
   <p:tag name="KSO_WM_BEAUTIFY_FLAG" val="#wm#"/>
   <p:tag name="KSO_WM_TEMPLATE_CATEGORY" val="custom"/>

</xml_diff>